<commit_message>
Changes to the Manuscript
</commit_message>
<xml_diff>
--- a/Manuscript/Figures/Data_Comparison_ecPoint_ForecastersExpertise.pptx
+++ b/Manuscript/Figures/Data_Comparison_ecPoint_ForecastersExpertise.pptx
@@ -104,19 +104,64 @@
       </a:defRPr>
     </a:lvl9pPr>
   </p:defaultTextStyle>
+  <p:extLst>
+    <p:ext uri="{EFAFB233-063F-42B5-8137-9DF3F51BA10A}">
+      <p15:sldGuideLst xmlns:p15="http://schemas.microsoft.com/office/powerpoint/2012/main"/>
+    </p:ext>
+  </p:extLst>
 </p:presentation>
-</file>
-
-<file path=ppt/revisionInfo.xml><?xml version="1.0" encoding="utf-8"?>
-<p1510:revInfo xmlns:a="http://schemas.openxmlformats.org/drawingml/2006/main" xmlns:r="http://schemas.openxmlformats.org/officeDocument/2006/relationships" xmlns:p1510="http://schemas.microsoft.com/office/powerpoint/2015/10/main">
-  <p1510:revLst>
-    <p1510:client id="{4F077B8E-A202-439B-B8B7-E34F009234AE}" v="157" dt="2021-07-15T15:01:46.780"/>
-  </p1510:revLst>
-</p1510:revInfo>
 </file>
 
 <file path=ppt/changesInfos/changesInfo1.xml><?xml version="1.0" encoding="utf-8"?>
 <pc:chgInfo xmlns:a="http://schemas.openxmlformats.org/drawingml/2006/main" xmlns:r="http://schemas.openxmlformats.org/officeDocument/2006/relationships" xmlns:ac="http://schemas.microsoft.com/office/drawing/2013/main/command" xmlns:pc="http://schemas.microsoft.com/office/powerpoint/2013/main/command">
+  <pc:docChgLst>
+    <pc:chgData name="Fatima Pillosu" userId="a6295d4dc9e22643" providerId="LiveId" clId="{78724FCF-D053-49E7-BA47-529A963F31DD}"/>
+    <pc:docChg chg="modSld">
+      <pc:chgData name="Fatima Pillosu" userId="a6295d4dc9e22643" providerId="LiveId" clId="{78724FCF-D053-49E7-BA47-529A963F31DD}" dt="2021-10-02T15:45:03.323" v="254" actId="113"/>
+      <pc:docMkLst>
+        <pc:docMk/>
+      </pc:docMkLst>
+      <pc:sldChg chg="modSp mod">
+        <pc:chgData name="Fatima Pillosu" userId="a6295d4dc9e22643" providerId="LiveId" clId="{78724FCF-D053-49E7-BA47-529A963F31DD}" dt="2021-10-02T15:45:03.323" v="254" actId="113"/>
+        <pc:sldMkLst>
+          <pc:docMk/>
+          <pc:sldMk cId="4214739204" sldId="256"/>
+        </pc:sldMkLst>
+        <pc:spChg chg="mod">
+          <ac:chgData name="Fatima Pillosu" userId="a6295d4dc9e22643" providerId="LiveId" clId="{78724FCF-D053-49E7-BA47-529A963F31DD}" dt="2021-10-02T15:41:43.760" v="44" actId="1076"/>
+          <ac:spMkLst>
+            <pc:docMk/>
+            <pc:sldMk cId="4214739204" sldId="256"/>
+            <ac:spMk id="202" creationId="{7DB1856B-5294-47F0-B6C4-67AAA8652488}"/>
+          </ac:spMkLst>
+        </pc:spChg>
+        <pc:spChg chg="mod">
+          <ac:chgData name="Fatima Pillosu" userId="a6295d4dc9e22643" providerId="LiveId" clId="{78724FCF-D053-49E7-BA47-529A963F31DD}" dt="2021-10-02T15:41:31.943" v="42" actId="1076"/>
+          <ac:spMkLst>
+            <pc:docMk/>
+            <pc:sldMk cId="4214739204" sldId="256"/>
+            <ac:spMk id="203" creationId="{0F5AF245-45D0-44B7-8794-F64F05F3C452}"/>
+          </ac:spMkLst>
+        </pc:spChg>
+        <pc:spChg chg="mod">
+          <ac:chgData name="Fatima Pillosu" userId="a6295d4dc9e22643" providerId="LiveId" clId="{78724FCF-D053-49E7-BA47-529A963F31DD}" dt="2021-10-02T15:45:03.323" v="254" actId="113"/>
+          <ac:spMkLst>
+            <pc:docMk/>
+            <pc:sldMk cId="4214739204" sldId="256"/>
+            <ac:spMk id="221" creationId="{913DF24B-5155-40AB-B061-E03163E89524}"/>
+          </ac:spMkLst>
+        </pc:spChg>
+        <pc:spChg chg="mod">
+          <ac:chgData name="Fatima Pillosu" userId="a6295d4dc9e22643" providerId="LiveId" clId="{78724FCF-D053-49E7-BA47-529A963F31DD}" dt="2021-10-02T15:44:40.382" v="252" actId="1076"/>
+          <ac:spMkLst>
+            <pc:docMk/>
+            <pc:sldMk cId="4214739204" sldId="256"/>
+            <ac:spMk id="224" creationId="{F989A21F-4114-4664-8626-0D55424DD1C2}"/>
+          </ac:spMkLst>
+        </pc:spChg>
+      </pc:sldChg>
+    </pc:docChg>
+  </pc:docChgLst>
   <pc:docChgLst>
     <pc:chgData name="Fatima Pillosu" userId="a6295d4dc9e22643" providerId="LiveId" clId="{4F077B8E-A202-439B-B8B7-E34F009234AE}"/>
     <pc:docChg chg="undo custSel modSld">
@@ -2091,7 +2136,7 @@
           <a:p>
             <a:fld id="{D997F26F-68BA-4EAE-A68A-75C472AE67C2}" type="datetimeFigureOut">
               <a:rPr lang="en-GB" smtClean="0"/>
-              <a:t>13/07/2021</a:t>
+              <a:t>02/10/2021</a:t>
             </a:fld>
             <a:endParaRPr lang="en-GB"/>
           </a:p>
@@ -2261,7 +2306,7 @@
           <a:p>
             <a:fld id="{D997F26F-68BA-4EAE-A68A-75C472AE67C2}" type="datetimeFigureOut">
               <a:rPr lang="en-GB" smtClean="0"/>
-              <a:t>13/07/2021</a:t>
+              <a:t>02/10/2021</a:t>
             </a:fld>
             <a:endParaRPr lang="en-GB"/>
           </a:p>
@@ -2441,7 +2486,7 @@
           <a:p>
             <a:fld id="{D997F26F-68BA-4EAE-A68A-75C472AE67C2}" type="datetimeFigureOut">
               <a:rPr lang="en-GB" smtClean="0"/>
-              <a:t>13/07/2021</a:t>
+              <a:t>02/10/2021</a:t>
             </a:fld>
             <a:endParaRPr lang="en-GB"/>
           </a:p>
@@ -2611,7 +2656,7 @@
           <a:p>
             <a:fld id="{D997F26F-68BA-4EAE-A68A-75C472AE67C2}" type="datetimeFigureOut">
               <a:rPr lang="en-GB" smtClean="0"/>
-              <a:t>13/07/2021</a:t>
+              <a:t>02/10/2021</a:t>
             </a:fld>
             <a:endParaRPr lang="en-GB"/>
           </a:p>
@@ -2857,7 +2902,7 @@
           <a:p>
             <a:fld id="{D997F26F-68BA-4EAE-A68A-75C472AE67C2}" type="datetimeFigureOut">
               <a:rPr lang="en-GB" smtClean="0"/>
-              <a:t>13/07/2021</a:t>
+              <a:t>02/10/2021</a:t>
             </a:fld>
             <a:endParaRPr lang="en-GB"/>
           </a:p>
@@ -3089,7 +3134,7 @@
           <a:p>
             <a:fld id="{D997F26F-68BA-4EAE-A68A-75C472AE67C2}" type="datetimeFigureOut">
               <a:rPr lang="en-GB" smtClean="0"/>
-              <a:t>13/07/2021</a:t>
+              <a:t>02/10/2021</a:t>
             </a:fld>
             <a:endParaRPr lang="en-GB"/>
           </a:p>
@@ -3456,7 +3501,7 @@
           <a:p>
             <a:fld id="{D997F26F-68BA-4EAE-A68A-75C472AE67C2}" type="datetimeFigureOut">
               <a:rPr lang="en-GB" smtClean="0"/>
-              <a:t>13/07/2021</a:t>
+              <a:t>02/10/2021</a:t>
             </a:fld>
             <a:endParaRPr lang="en-GB"/>
           </a:p>
@@ -3574,7 +3619,7 @@
           <a:p>
             <a:fld id="{D997F26F-68BA-4EAE-A68A-75C472AE67C2}" type="datetimeFigureOut">
               <a:rPr lang="en-GB" smtClean="0"/>
-              <a:t>13/07/2021</a:t>
+              <a:t>02/10/2021</a:t>
             </a:fld>
             <a:endParaRPr lang="en-GB"/>
           </a:p>
@@ -3669,7 +3714,7 @@
           <a:p>
             <a:fld id="{D997F26F-68BA-4EAE-A68A-75C472AE67C2}" type="datetimeFigureOut">
               <a:rPr lang="en-GB" smtClean="0"/>
-              <a:t>13/07/2021</a:t>
+              <a:t>02/10/2021</a:t>
             </a:fld>
             <a:endParaRPr lang="en-GB"/>
           </a:p>
@@ -3946,7 +3991,7 @@
           <a:p>
             <a:fld id="{D997F26F-68BA-4EAE-A68A-75C472AE67C2}" type="datetimeFigureOut">
               <a:rPr lang="en-GB" smtClean="0"/>
-              <a:t>13/07/2021</a:t>
+              <a:t>02/10/2021</a:t>
             </a:fld>
             <a:endParaRPr lang="en-GB"/>
           </a:p>
@@ -4203,7 +4248,7 @@
           <a:p>
             <a:fld id="{D997F26F-68BA-4EAE-A68A-75C472AE67C2}" type="datetimeFigureOut">
               <a:rPr lang="en-GB" smtClean="0"/>
-              <a:t>13/07/2021</a:t>
+              <a:t>02/10/2021</a:t>
             </a:fld>
             <a:endParaRPr lang="en-GB"/>
           </a:p>
@@ -4416,7 +4461,7 @@
           <a:p>
             <a:fld id="{D997F26F-68BA-4EAE-A68A-75C472AE67C2}" type="datetimeFigureOut">
               <a:rPr lang="en-GB" smtClean="0"/>
-              <a:t>13/07/2021</a:t>
+              <a:t>02/10/2021</a:t>
             </a:fld>
             <a:endParaRPr lang="en-GB"/>
           </a:p>
@@ -4951,8 +4996,8 @@
         </p:nvSpPr>
         <p:spPr>
           <a:xfrm>
-            <a:off x="1862225" y="629844"/>
-            <a:ext cx="1476000" cy="1061829"/>
+            <a:off x="1862225" y="686919"/>
+            <a:ext cx="1476000" cy="1007968"/>
           </a:xfrm>
           <a:prstGeom prst="rect">
             <a:avLst/>
@@ -4967,11 +5012,11 @@
           <a:p>
             <a:pPr algn="r"/>
             <a:r>
-              <a:rPr lang="en-GB" sz="900" dirty="0"/>
-              <a:t>Forecasters </a:t>
-            </a:r>
-            <a:r>
-              <a:rPr lang="en-GB" sz="900" b="1" dirty="0">
+              <a:rPr lang="en-GB" sz="850" dirty="0"/>
+              <a:t>At a location, forecasters </a:t>
+            </a:r>
+            <a:r>
+              <a:rPr lang="en-GB" sz="850" b="1" dirty="0">
                 <a:solidFill>
                   <a:schemeClr val="bg1"/>
                 </a:solidFill>
@@ -4979,11 +5024,11 @@
               <a:t>relate</a:t>
             </a:r>
             <a:r>
-              <a:rPr lang="en-GB" sz="900" dirty="0"/>
+              <a:rPr lang="en-GB" sz="850" dirty="0"/>
               <a:t> the upcoming weather pattern to their </a:t>
             </a:r>
             <a:r>
-              <a:rPr lang="en-GB" sz="900" b="1" dirty="0">
+              <a:rPr lang="en-GB" sz="850" b="1" dirty="0">
                 <a:solidFill>
                   <a:schemeClr val="bg1"/>
                 </a:solidFill>
@@ -4991,11 +5036,11 @@
               <a:t>experience of</a:t>
             </a:r>
             <a:r>
-              <a:rPr lang="en-GB" sz="900" dirty="0"/>
+              <a:rPr lang="en-GB" sz="850" dirty="0"/>
               <a:t> </a:t>
             </a:r>
             <a:r>
-              <a:rPr lang="en-GB" sz="900" b="1" dirty="0">
+              <a:rPr lang="en-GB" sz="850" b="1" dirty="0">
                 <a:solidFill>
                   <a:schemeClr val="bg1"/>
                 </a:solidFill>
@@ -5003,11 +5048,11 @@
               <a:t>similar local patterns</a:t>
             </a:r>
             <a:r>
-              <a:rPr lang="en-GB" sz="900" dirty="0"/>
+              <a:rPr lang="en-GB" sz="850" dirty="0"/>
               <a:t>, and recall how the model performed then relative to </a:t>
             </a:r>
             <a:r>
-              <a:rPr lang="en-GB" sz="900" b="1" dirty="0">
+              <a:rPr lang="en-GB" sz="850" b="1" dirty="0">
                 <a:solidFill>
                   <a:schemeClr val="bg1"/>
                 </a:solidFill>
@@ -5015,7 +5060,7 @@
               <a:t>local observations</a:t>
             </a:r>
             <a:r>
-              <a:rPr lang="en-GB" sz="900" dirty="0"/>
+              <a:rPr lang="en-GB" sz="850" dirty="0"/>
               <a:t>.</a:t>
             </a:r>
           </a:p>
@@ -5035,8 +5080,8 @@
         </p:nvSpPr>
         <p:spPr>
           <a:xfrm>
-            <a:off x="4352210" y="641110"/>
-            <a:ext cx="1637392" cy="1061829"/>
+            <a:off x="4352210" y="611529"/>
+            <a:ext cx="1593009" cy="1138773"/>
           </a:xfrm>
           <a:prstGeom prst="rect">
             <a:avLst/>
@@ -5050,43 +5095,35 @@
           <a:lstStyle/>
           <a:p>
             <a:r>
-              <a:rPr lang="en-GB" sz="900" dirty="0"/>
-              <a:t>During post-processing, ecPoint </a:t>
-            </a:r>
-            <a:r>
-              <a:rPr lang="en-GB" sz="900" b="1" dirty="0">
+              <a:rPr lang="en-GB" sz="850" dirty="0"/>
+              <a:t>At a location, ecPoint </a:t>
+            </a:r>
+            <a:r>
+              <a:rPr lang="en-GB" sz="850" b="1" dirty="0">
                 <a:solidFill>
                   <a:schemeClr val="bg1"/>
                 </a:solidFill>
               </a:rPr>
-              <a:t>cross-references</a:t>
-            </a:r>
-            <a:r>
-              <a:rPr lang="en-GB" sz="900" dirty="0"/>
-              <a:t> </a:t>
-            </a:r>
-            <a:r>
-              <a:rPr lang="en-GB" sz="900"/>
-              <a:t>the upcoming </a:t>
-            </a:r>
-            <a:r>
-              <a:rPr lang="en-GB" sz="900" dirty="0"/>
-              <a:t>weather pattern to </a:t>
-            </a:r>
-            <a:r>
-              <a:rPr lang="en-GB" sz="900" b="1" dirty="0">
+              <a:t>cross-references </a:t>
+            </a:r>
+            <a:r>
+              <a:rPr lang="en-GB" sz="850" dirty="0"/>
+              <a:t>during post-processing the upcoming weather pattern to </a:t>
+            </a:r>
+            <a:r>
+              <a:rPr lang="en-GB" sz="850" b="1" dirty="0">
                 <a:solidFill>
                   <a:schemeClr val="bg1"/>
                 </a:solidFill>
               </a:rPr>
-              <a:t>similar past patterns, worldwide </a:t>
-            </a:r>
-            <a:r>
-              <a:rPr lang="en-GB" sz="900" dirty="0"/>
+              <a:t>similar past patterns worldwide </a:t>
+            </a:r>
+            <a:r>
+              <a:rPr lang="en-GB" sz="850" dirty="0"/>
               <a:t>and assesses model performance then relative to </a:t>
             </a:r>
             <a:r>
-              <a:rPr lang="en-GB" sz="900" b="1" dirty="0">
+              <a:rPr lang="en-GB" sz="850" b="1" dirty="0">
                 <a:solidFill>
                   <a:schemeClr val="bg1"/>
                 </a:solidFill>
@@ -5094,7 +5131,7 @@
               <a:t>(worldwide) observations</a:t>
             </a:r>
             <a:r>
-              <a:rPr lang="en-GB" sz="900" dirty="0"/>
+              <a:rPr lang="en-GB" sz="850" dirty="0"/>
               <a:t>.</a:t>
             </a:r>
           </a:p>
@@ -5998,7 +6035,7 @@
         <p:spPr>
           <a:xfrm>
             <a:off x="-75761" y="389228"/>
-            <a:ext cx="1404000" cy="923330"/>
+            <a:ext cx="1404000" cy="1061829"/>
           </a:xfrm>
           <a:prstGeom prst="rect">
             <a:avLst/>
@@ -6014,27 +6051,19 @@
             <a:pPr algn="r"/>
             <a:r>
               <a:rPr lang="en-GB" sz="900" dirty="0"/>
-              <a:t>Forecasters cannot use </a:t>
+              <a:t>Forecasters </a:t>
             </a:r>
             <a:r>
               <a:rPr lang="en-GB" sz="900" b="1" dirty="0">
                 <a:solidFill>
-                  <a:srgbClr val="7030A0"/>
+                  <a:srgbClr val="985EBE"/>
                 </a:solidFill>
               </a:rPr>
-              <a:t>experience</a:t>
-            </a:r>
-            <a:r>
-              <a:rPr lang="en-GB" sz="900" dirty="0">
-                <a:solidFill>
-                  <a:srgbClr val="7030A0"/>
-                </a:solidFill>
-              </a:rPr>
-              <a:t> </a:t>
+              <a:t>cannot use experience of events which have not previously happened at the location of interest</a:t>
             </a:r>
             <a:r>
               <a:rPr lang="en-GB" sz="900" dirty="0"/>
-              <a:t>of events which have not previously happened, nor of events for which there is no verifying data</a:t>
+              <a:t>, nor of events for which there is no verifying data</a:t>
             </a:r>
             <a:r>
               <a:rPr lang="en-GB" sz="900" b="1" dirty="0">
@@ -6182,8 +6211,8 @@
         </p:nvSpPr>
         <p:spPr>
           <a:xfrm>
-            <a:off x="6349556" y="191475"/>
-            <a:ext cx="1404000" cy="1200329"/>
+            <a:off x="6342936" y="28598"/>
+            <a:ext cx="1404000" cy="1446550"/>
           </a:xfrm>
           <a:prstGeom prst="rect">
             <a:avLst/>
@@ -6197,22 +6226,22 @@
           <a:lstStyle/>
           <a:p>
             <a:r>
-              <a:rPr lang="en-GB" sz="900" dirty="0"/>
+              <a:rPr lang="en-GB" sz="800" dirty="0"/>
               <a:t>ecPoint uses</a:t>
             </a:r>
             <a:r>
-              <a:rPr lang="en-GB" sz="900" b="1" dirty="0">
+              <a:rPr lang="en-GB" sz="800" b="1" dirty="0">
                 <a:solidFill>
                   <a:srgbClr val="FF7F2A"/>
                 </a:solidFill>
               </a:rPr>
-              <a:t> remote learning </a:t>
-            </a:r>
-            <a:r>
-              <a:rPr lang="en-GB" sz="900" dirty="0"/>
-              <a:t>to know what post-processing to apply for rare events, or for areas with no observations (verification remains impossible without observations). </a:t>
-            </a:r>
-            <a:endParaRPr lang="en-GB" sz="900" b="1" dirty="0">
+              <a:t> remote learning to know what post-processing to apply for rare events at the location of interest</a:t>
+            </a:r>
+            <a:r>
+              <a:rPr lang="en-GB" sz="800" dirty="0"/>
+              <a:t>, or for areas with no observations. Verification remains impossible without observations, as post-processing for events that have not happened anywhere in the world. </a:t>
+            </a:r>
+            <a:endParaRPr lang="en-GB" sz="800" b="1" dirty="0">
               <a:solidFill>
                 <a:srgbClr val="7030A0"/>
               </a:solidFill>

</xml_diff>